<commit_message>
Updating slides of Greedy Algorithm (2)
</commit_message>
<xml_diff>
--- a/161702/presentation/09 - Midterm Exam Evaluation & Greedy Algorithm 1/09. Greedy Algorithm (1).pptx
+++ b/161702/presentation/09 - Midterm Exam Evaluation & Greedy Algorithm 1/09. Greedy Algorithm (1).pptx
@@ -5,7 +5,7 @@
     <p:sldMasterId id="2147483672" r:id="rId1"/>
   </p:sldMasterIdLst>
   <p:notesMasterIdLst>
-    <p:notesMasterId r:id="rId38"/>
+    <p:notesMasterId r:id="rId40"/>
   </p:notesMasterIdLst>
   <p:sldIdLst>
     <p:sldId id="256" r:id="rId2"/>
@@ -35,15 +35,17 @@
     <p:sldId id="281" r:id="rId26"/>
     <p:sldId id="298" r:id="rId27"/>
     <p:sldId id="299" r:id="rId28"/>
-    <p:sldId id="300" r:id="rId29"/>
-    <p:sldId id="301" r:id="rId30"/>
-    <p:sldId id="283" r:id="rId31"/>
-    <p:sldId id="284" r:id="rId32"/>
-    <p:sldId id="285" r:id="rId33"/>
-    <p:sldId id="262" r:id="rId34"/>
-    <p:sldId id="278" r:id="rId35"/>
-    <p:sldId id="279" r:id="rId36"/>
-    <p:sldId id="280" r:id="rId37"/>
+    <p:sldId id="304" r:id="rId29"/>
+    <p:sldId id="305" r:id="rId30"/>
+    <p:sldId id="300" r:id="rId31"/>
+    <p:sldId id="301" r:id="rId32"/>
+    <p:sldId id="283" r:id="rId33"/>
+    <p:sldId id="284" r:id="rId34"/>
+    <p:sldId id="285" r:id="rId35"/>
+    <p:sldId id="262" r:id="rId36"/>
+    <p:sldId id="278" r:id="rId37"/>
+    <p:sldId id="279" r:id="rId38"/>
+    <p:sldId id="280" r:id="rId39"/>
   </p:sldIdLst>
   <p:sldSz cx="9144000" cy="6858000" type="screen4x3"/>
   <p:notesSz cx="6858000" cy="9144000"/>
@@ -232,7 +234,7 @@
           <a:p>
             <a:fld id="{5939F4E3-8BDD-4AA5-AC28-DFF8CE22DD48}" type="datetimeFigureOut">
               <a:rPr lang="en-US" smtClean="0"/>
-              <a:t>4/18/2017</a:t>
+              <a:t>4/25/2017</a:t>
             </a:fld>
             <a:endParaRPr lang="en-US"/>
           </a:p>
@@ -2479,7 +2481,7 @@
           <a:p>
             <a:fld id="{EEC58B07-EB7E-44AD-A74F-F52443C83A19}" type="datetimeFigureOut">
               <a:rPr lang="en-US" smtClean="0"/>
-              <a:t>4/18/2017</a:t>
+              <a:t>4/25/2017</a:t>
             </a:fld>
             <a:endParaRPr lang="en-US"/>
           </a:p>
@@ -2657,7 +2659,7 @@
           <a:p>
             <a:fld id="{EEC58B07-EB7E-44AD-A74F-F52443C83A19}" type="datetimeFigureOut">
               <a:rPr lang="en-US" smtClean="0"/>
-              <a:t>4/18/2017</a:t>
+              <a:t>4/25/2017</a:t>
             </a:fld>
             <a:endParaRPr lang="en-US"/>
           </a:p>
@@ -2837,7 +2839,7 @@
           <a:p>
             <a:fld id="{EEC58B07-EB7E-44AD-A74F-F52443C83A19}" type="datetimeFigureOut">
               <a:rPr lang="en-US" smtClean="0"/>
-              <a:t>4/18/2017</a:t>
+              <a:t>4/25/2017</a:t>
             </a:fld>
             <a:endParaRPr lang="en-US"/>
           </a:p>
@@ -3081,7 +3083,7 @@
             <a:fld id="{E22EDF8C-5B3B-445A-AF06-0E8B295A5406}" type="datetime1">
               <a:rPr lang="zh-TW" altLang="en-US"/>
               <a:pPr/>
-              <a:t>2017/4/18</a:t>
+              <a:t>2017/4/25</a:t>
             </a:fld>
             <a:endParaRPr lang="en-US" altLang="zh-TW"/>
           </a:p>
@@ -3403,7 +3405,7 @@
             <a:fld id="{320B7D7E-A39D-4478-B1D4-9E28DF41077B}" type="datetime1">
               <a:rPr lang="zh-TW" altLang="en-US"/>
               <a:pPr/>
-              <a:t>2017/4/18</a:t>
+              <a:t>2017/4/25</a:t>
             </a:fld>
             <a:endParaRPr lang="en-US" altLang="zh-TW"/>
           </a:p>
@@ -3635,7 +3637,7 @@
           <a:p>
             <a:fld id="{EEC58B07-EB7E-44AD-A74F-F52443C83A19}" type="datetimeFigureOut">
               <a:rPr lang="en-US" smtClean="0"/>
-              <a:t>4/18/2017</a:t>
+              <a:t>4/25/2017</a:t>
             </a:fld>
             <a:endParaRPr lang="en-US"/>
           </a:p>
@@ -3885,7 +3887,7 @@
           <a:p>
             <a:fld id="{EEC58B07-EB7E-44AD-A74F-F52443C83A19}" type="datetimeFigureOut">
               <a:rPr lang="en-US" smtClean="0"/>
-              <a:t>4/18/2017</a:t>
+              <a:t>4/25/2017</a:t>
             </a:fld>
             <a:endParaRPr lang="en-US"/>
           </a:p>
@@ -4125,7 +4127,7 @@
           <a:p>
             <a:fld id="{EEC58B07-EB7E-44AD-A74F-F52443C83A19}" type="datetimeFigureOut">
               <a:rPr lang="en-US" smtClean="0"/>
-              <a:t>4/18/2017</a:t>
+              <a:t>4/25/2017</a:t>
             </a:fld>
             <a:endParaRPr lang="en-US"/>
           </a:p>
@@ -4500,7 +4502,7 @@
           <a:p>
             <a:fld id="{EEC58B07-EB7E-44AD-A74F-F52443C83A19}" type="datetimeFigureOut">
               <a:rPr lang="en-US" smtClean="0"/>
-              <a:t>4/18/2017</a:t>
+              <a:t>4/25/2017</a:t>
             </a:fld>
             <a:endParaRPr lang="en-US"/>
           </a:p>
@@ -4626,7 +4628,7 @@
           <a:p>
             <a:fld id="{EEC58B07-EB7E-44AD-A74F-F52443C83A19}" type="datetimeFigureOut">
               <a:rPr lang="en-US" smtClean="0"/>
-              <a:t>4/18/2017</a:t>
+              <a:t>4/25/2017</a:t>
             </a:fld>
             <a:endParaRPr lang="en-US"/>
           </a:p>
@@ -4721,7 +4723,7 @@
           <a:p>
             <a:fld id="{EEC58B07-EB7E-44AD-A74F-F52443C83A19}" type="datetimeFigureOut">
               <a:rPr lang="en-US" smtClean="0"/>
-              <a:t>4/18/2017</a:t>
+              <a:t>4/25/2017</a:t>
             </a:fld>
             <a:endParaRPr lang="en-US"/>
           </a:p>
@@ -4998,7 +5000,7 @@
           <a:p>
             <a:fld id="{EEC58B07-EB7E-44AD-A74F-F52443C83A19}" type="datetimeFigureOut">
               <a:rPr lang="en-US" smtClean="0"/>
-              <a:t>4/18/2017</a:t>
+              <a:t>4/25/2017</a:t>
             </a:fld>
             <a:endParaRPr lang="en-US"/>
           </a:p>
@@ -5255,7 +5257,7 @@
           <a:p>
             <a:fld id="{EEC58B07-EB7E-44AD-A74F-F52443C83A19}" type="datetimeFigureOut">
               <a:rPr lang="en-US" smtClean="0"/>
-              <a:t>4/18/2017</a:t>
+              <a:t>4/25/2017</a:t>
             </a:fld>
             <a:endParaRPr lang="en-US"/>
           </a:p>
@@ -5468,7 +5470,7 @@
           <a:p>
             <a:fld id="{EEC58B07-EB7E-44AD-A74F-F52443C83A19}" type="datetimeFigureOut">
               <a:rPr lang="en-US" smtClean="0"/>
-              <a:t>4/18/2017</a:t>
+              <a:t>4/25/2017</a:t>
             </a:fld>
             <a:endParaRPr lang="en-US"/>
           </a:p>
@@ -5907,11 +5909,7 @@
           <a:p>
             <a:r>
               <a:rPr lang="en-US" dirty="0" smtClean="0"/>
-              <a:t>09. </a:t>
-            </a:r>
-            <a:r>
-              <a:rPr lang="en-US" dirty="0" smtClean="0"/>
-              <a:t>Greedy Algorithm (1)</a:t>
+              <a:t>09. Greedy Algorithm (1)</a:t>
             </a:r>
             <a:endParaRPr lang="en-US" dirty="0"/>
           </a:p>
@@ -18286,7 +18284,7 @@
           <a:graphicData uri="http://schemas.openxmlformats.org/presentationml/2006/ole">
             <mc:AlternateContent xmlns:mc="http://schemas.openxmlformats.org/markup-compatibility/2006">
               <mc:Choice xmlns:v="urn:schemas-microsoft-com:vml" Requires="v">
-                <p:oleObj spid="_x0000_s2078" name="方程式" r:id="rId3" imgW="469800" imgH="266400" progId="Equation.3">
+                <p:oleObj spid="_x0000_s2082" name="方程式" r:id="rId3" imgW="469800" imgH="266400" progId="Equation.3">
                   <p:embed/>
                 </p:oleObj>
               </mc:Choice>
@@ -18557,6 +18555,1171 @@
 </file>
 
 <file path=ppt/slides/slide28.xml><?xml version="1.0" encoding="utf-8"?>
+<p:sld xmlns:a="http://schemas.openxmlformats.org/drawingml/2006/main" xmlns:r="http://schemas.openxmlformats.org/officeDocument/2006/relationships" xmlns:p="http://schemas.openxmlformats.org/presentationml/2006/main">
+  <p:cSld>
+    <p:spTree>
+      <p:nvGrpSpPr>
+        <p:cNvPr id="1" name=""/>
+        <p:cNvGrpSpPr/>
+        <p:nvPr/>
+      </p:nvGrpSpPr>
+      <p:grpSpPr>
+        <a:xfrm>
+          <a:off x="0" y="0"/>
+          <a:ext cx="0" cy="0"/>
+          <a:chOff x="0" y="0"/>
+          <a:chExt cx="0" cy="0"/>
+        </a:xfrm>
+      </p:grpSpPr>
+      <p:sp>
+        <p:nvSpPr>
+          <p:cNvPr id="3" name="Rectangle 2"/>
+          <p:cNvSpPr/>
+          <p:nvPr/>
+        </p:nvSpPr>
+        <p:spPr>
+          <a:xfrm>
+            <a:off x="528637" y="616194"/>
+            <a:ext cx="8143875" cy="5614999"/>
+          </a:xfrm>
+          <a:prstGeom prst="rect">
+            <a:avLst/>
+          </a:prstGeom>
+        </p:spPr>
+        <p:style>
+          <a:lnRef idx="2">
+            <a:schemeClr val="accent6"/>
+          </a:lnRef>
+          <a:fillRef idx="1">
+            <a:schemeClr val="lt1"/>
+          </a:fillRef>
+          <a:effectRef idx="0">
+            <a:schemeClr val="accent6"/>
+          </a:effectRef>
+          <a:fontRef idx="minor">
+            <a:schemeClr val="dk1"/>
+          </a:fontRef>
+        </p:style>
+        <p:txBody>
+          <a:bodyPr wrap="square">
+            <a:spAutoFit/>
+          </a:bodyPr>
+          <a:lstStyle/>
+          <a:p>
+            <a:pPr>
+              <a:lnSpc>
+                <a:spcPct val="107000"/>
+              </a:lnSpc>
+              <a:spcAft>
+                <a:spcPts val="600"/>
+              </a:spcAft>
+            </a:pPr>
+            <a:r>
+              <a:rPr lang="en-US" dirty="0">
+                <a:latin typeface="Calibri" panose="020F0502020204030204" pitchFamily="34" charset="0"/>
+                <a:ea typeface="PMingLiU" panose="02020500000000000000" pitchFamily="18" charset="-120"/>
+                <a:cs typeface="Times New Roman" panose="02020603050405020304" pitchFamily="18" charset="0"/>
+              </a:rPr>
+              <a:t>// d: deadline</a:t>
+            </a:r>
+          </a:p>
+          <a:p>
+            <a:pPr>
+              <a:lnSpc>
+                <a:spcPct val="107000"/>
+              </a:lnSpc>
+              <a:spcAft>
+                <a:spcPts val="600"/>
+              </a:spcAft>
+            </a:pPr>
+            <a:r>
+              <a:rPr lang="en-US" dirty="0">
+                <a:latin typeface="Calibri" panose="020F0502020204030204" pitchFamily="34" charset="0"/>
+                <a:ea typeface="PMingLiU" panose="02020500000000000000" pitchFamily="18" charset="-120"/>
+                <a:cs typeface="Times New Roman" panose="02020603050405020304" pitchFamily="18" charset="0"/>
+              </a:rPr>
+              <a:t>// profit: profit</a:t>
+            </a:r>
+          </a:p>
+          <a:p>
+            <a:pPr>
+              <a:lnSpc>
+                <a:spcPct val="107000"/>
+              </a:lnSpc>
+              <a:spcAft>
+                <a:spcPts val="600"/>
+              </a:spcAft>
+            </a:pPr>
+            <a:r>
+              <a:rPr lang="en-US" dirty="0">
+                <a:latin typeface="Calibri" panose="020F0502020204030204" pitchFamily="34" charset="0"/>
+                <a:ea typeface="PMingLiU" panose="02020500000000000000" pitchFamily="18" charset="-120"/>
+                <a:cs typeface="Times New Roman" panose="02020603050405020304" pitchFamily="18" charset="0"/>
+              </a:rPr>
+              <a:t>// t: timeline</a:t>
+            </a:r>
+          </a:p>
+          <a:p>
+            <a:pPr>
+              <a:lnSpc>
+                <a:spcPct val="107000"/>
+              </a:lnSpc>
+              <a:spcAft>
+                <a:spcPts val="600"/>
+              </a:spcAft>
+            </a:pPr>
+            <a:r>
+              <a:rPr lang="en-US" dirty="0">
+                <a:latin typeface="Calibri" panose="020F0502020204030204" pitchFamily="34" charset="0"/>
+                <a:ea typeface="PMingLiU" panose="02020500000000000000" pitchFamily="18" charset="-120"/>
+                <a:cs typeface="Times New Roman" panose="02020603050405020304" pitchFamily="18" charset="0"/>
+              </a:rPr>
+              <a:t>// We assume that the jobs already sorted by its profit (descending order)</a:t>
+            </a:r>
+          </a:p>
+          <a:p>
+            <a:pPr>
+              <a:lnSpc>
+                <a:spcPct val="107000"/>
+              </a:lnSpc>
+              <a:spcAft>
+                <a:spcPts val="600"/>
+              </a:spcAft>
+            </a:pPr>
+            <a:r>
+              <a:rPr lang="en-US" dirty="0">
+                <a:latin typeface="Calibri" panose="020F0502020204030204" pitchFamily="34" charset="0"/>
+                <a:ea typeface="PMingLiU" panose="02020500000000000000" pitchFamily="18" charset="-120"/>
+                <a:cs typeface="Times New Roman" panose="02020603050405020304" pitchFamily="18" charset="0"/>
+              </a:rPr>
+              <a:t>Job-sequencing()</a:t>
+            </a:r>
+          </a:p>
+          <a:p>
+            <a:pPr marL="342900" lvl="0" indent="-342900">
+              <a:lnSpc>
+                <a:spcPct val="107000"/>
+              </a:lnSpc>
+              <a:spcAft>
+                <a:spcPts val="600"/>
+              </a:spcAft>
+              <a:buFont typeface="+mj-lt"/>
+              <a:buAutoNum type="arabicPeriod"/>
+            </a:pPr>
+            <a:r>
+              <a:rPr lang="en-US" dirty="0">
+                <a:latin typeface="Calibri" panose="020F0502020204030204" pitchFamily="34" charset="0"/>
+                <a:ea typeface="PMingLiU" panose="02020500000000000000" pitchFamily="18" charset="-120"/>
+                <a:cs typeface="Times New Roman" panose="02020603050405020304" pitchFamily="18" charset="0"/>
+              </a:rPr>
+              <a:t>total = 0</a:t>
+            </a:r>
+          </a:p>
+          <a:p>
+            <a:pPr marL="342900" lvl="0" indent="-342900">
+              <a:lnSpc>
+                <a:spcPct val="107000"/>
+              </a:lnSpc>
+              <a:spcAft>
+                <a:spcPts val="600"/>
+              </a:spcAft>
+              <a:buFont typeface="+mj-lt"/>
+              <a:buAutoNum type="arabicPeriod"/>
+            </a:pPr>
+            <a:r>
+              <a:rPr lang="en-US" dirty="0">
+                <a:latin typeface="Calibri" panose="020F0502020204030204" pitchFamily="34" charset="0"/>
+                <a:ea typeface="PMingLiU" panose="02020500000000000000" pitchFamily="18" charset="-120"/>
+                <a:cs typeface="Times New Roman" panose="02020603050405020304" pitchFamily="18" charset="0"/>
+              </a:rPr>
+              <a:t>for </a:t>
+            </a:r>
+            <a:r>
+              <a:rPr lang="en-US" dirty="0" err="1">
+                <a:latin typeface="Calibri" panose="020F0502020204030204" pitchFamily="34" charset="0"/>
+                <a:ea typeface="PMingLiU" panose="02020500000000000000" pitchFamily="18" charset="-120"/>
+                <a:cs typeface="Times New Roman" panose="02020603050405020304" pitchFamily="18" charset="0"/>
+              </a:rPr>
+              <a:t>i</a:t>
+            </a:r>
+            <a:r>
+              <a:rPr lang="en-US" dirty="0">
+                <a:latin typeface="Calibri" panose="020F0502020204030204" pitchFamily="34" charset="0"/>
+                <a:ea typeface="PMingLiU" panose="02020500000000000000" pitchFamily="18" charset="-120"/>
+                <a:cs typeface="Times New Roman" panose="02020603050405020304" pitchFamily="18" charset="0"/>
+              </a:rPr>
+              <a:t> = 1 to n</a:t>
+            </a:r>
+          </a:p>
+          <a:p>
+            <a:pPr marL="342900" lvl="0" indent="-342900">
+              <a:lnSpc>
+                <a:spcPct val="107000"/>
+              </a:lnSpc>
+              <a:spcAft>
+                <a:spcPts val="600"/>
+              </a:spcAft>
+              <a:buFont typeface="+mj-lt"/>
+              <a:buAutoNum type="arabicPeriod"/>
+            </a:pPr>
+            <a:r>
+              <a:rPr lang="en-US" dirty="0">
+                <a:latin typeface="Calibri" panose="020F0502020204030204" pitchFamily="34" charset="0"/>
+                <a:ea typeface="PMingLiU" panose="02020500000000000000" pitchFamily="18" charset="-120"/>
+                <a:cs typeface="Times New Roman" panose="02020603050405020304" pitchFamily="18" charset="0"/>
+              </a:rPr>
+              <a:t>	k = d[</a:t>
+            </a:r>
+            <a:r>
+              <a:rPr lang="en-US" dirty="0" err="1">
+                <a:latin typeface="Calibri" panose="020F0502020204030204" pitchFamily="34" charset="0"/>
+                <a:ea typeface="PMingLiU" panose="02020500000000000000" pitchFamily="18" charset="-120"/>
+                <a:cs typeface="Times New Roman" panose="02020603050405020304" pitchFamily="18" charset="0"/>
+              </a:rPr>
+              <a:t>i</a:t>
+            </a:r>
+            <a:r>
+              <a:rPr lang="en-US" dirty="0">
+                <a:latin typeface="Calibri" panose="020F0502020204030204" pitchFamily="34" charset="0"/>
+                <a:ea typeface="PMingLiU" panose="02020500000000000000" pitchFamily="18" charset="-120"/>
+                <a:cs typeface="Times New Roman" panose="02020603050405020304" pitchFamily="18" charset="0"/>
+              </a:rPr>
+              <a:t>]</a:t>
+            </a:r>
+          </a:p>
+          <a:p>
+            <a:pPr marL="342900" lvl="0" indent="-342900">
+              <a:lnSpc>
+                <a:spcPct val="107000"/>
+              </a:lnSpc>
+              <a:spcAft>
+                <a:spcPts val="600"/>
+              </a:spcAft>
+              <a:buFont typeface="+mj-lt"/>
+              <a:buAutoNum type="arabicPeriod"/>
+            </a:pPr>
+            <a:r>
+              <a:rPr lang="en-US" dirty="0">
+                <a:latin typeface="Calibri" panose="020F0502020204030204" pitchFamily="34" charset="0"/>
+                <a:ea typeface="PMingLiU" panose="02020500000000000000" pitchFamily="18" charset="-120"/>
+                <a:cs typeface="Times New Roman" panose="02020603050405020304" pitchFamily="18" charset="0"/>
+              </a:rPr>
+              <a:t>	while t[k] == 1 and k &gt; 0</a:t>
+            </a:r>
+          </a:p>
+          <a:p>
+            <a:pPr marL="342900" lvl="0" indent="-342900">
+              <a:lnSpc>
+                <a:spcPct val="107000"/>
+              </a:lnSpc>
+              <a:spcAft>
+                <a:spcPts val="600"/>
+              </a:spcAft>
+              <a:buFont typeface="+mj-lt"/>
+              <a:buAutoNum type="arabicPeriod"/>
+            </a:pPr>
+            <a:r>
+              <a:rPr lang="en-US" dirty="0">
+                <a:latin typeface="Calibri" panose="020F0502020204030204" pitchFamily="34" charset="0"/>
+                <a:ea typeface="PMingLiU" panose="02020500000000000000" pitchFamily="18" charset="-120"/>
+                <a:cs typeface="Times New Roman" panose="02020603050405020304" pitchFamily="18" charset="0"/>
+              </a:rPr>
+              <a:t>		</a:t>
+            </a:r>
+            <a:r>
+              <a:rPr lang="en-US" dirty="0" smtClean="0">
+                <a:latin typeface="Calibri" panose="020F0502020204030204" pitchFamily="34" charset="0"/>
+                <a:ea typeface="PMingLiU" panose="02020500000000000000" pitchFamily="18" charset="-120"/>
+                <a:cs typeface="Times New Roman" panose="02020603050405020304" pitchFamily="18" charset="0"/>
+              </a:rPr>
+              <a:t>k </a:t>
+            </a:r>
+            <a:r>
+              <a:rPr lang="en-US" dirty="0">
+                <a:latin typeface="Calibri" panose="020F0502020204030204" pitchFamily="34" charset="0"/>
+                <a:ea typeface="PMingLiU" panose="02020500000000000000" pitchFamily="18" charset="-120"/>
+                <a:cs typeface="Times New Roman" panose="02020603050405020304" pitchFamily="18" charset="0"/>
+              </a:rPr>
+              <a:t>= k – 1</a:t>
+            </a:r>
+          </a:p>
+          <a:p>
+            <a:pPr marL="342900" lvl="0" indent="-342900">
+              <a:lnSpc>
+                <a:spcPct val="107000"/>
+              </a:lnSpc>
+              <a:spcAft>
+                <a:spcPts val="600"/>
+              </a:spcAft>
+              <a:buFont typeface="+mj-lt"/>
+              <a:buAutoNum type="arabicPeriod"/>
+            </a:pPr>
+            <a:r>
+              <a:rPr lang="en-US" dirty="0">
+                <a:latin typeface="Calibri" panose="020F0502020204030204" pitchFamily="34" charset="0"/>
+                <a:ea typeface="PMingLiU" panose="02020500000000000000" pitchFamily="18" charset="-120"/>
+                <a:cs typeface="Times New Roman" panose="02020603050405020304" pitchFamily="18" charset="0"/>
+              </a:rPr>
+              <a:t>	if k!= 0</a:t>
+            </a:r>
+          </a:p>
+          <a:p>
+            <a:pPr marL="342900" lvl="0" indent="-342900">
+              <a:lnSpc>
+                <a:spcPct val="107000"/>
+              </a:lnSpc>
+              <a:spcAft>
+                <a:spcPts val="600"/>
+              </a:spcAft>
+              <a:buFont typeface="+mj-lt"/>
+              <a:buAutoNum type="arabicPeriod"/>
+            </a:pPr>
+            <a:r>
+              <a:rPr lang="en-US" dirty="0">
+                <a:latin typeface="Calibri" panose="020F0502020204030204" pitchFamily="34" charset="0"/>
+                <a:ea typeface="PMingLiU" panose="02020500000000000000" pitchFamily="18" charset="-120"/>
+                <a:cs typeface="Times New Roman" panose="02020603050405020304" pitchFamily="18" charset="0"/>
+              </a:rPr>
+              <a:t>		</a:t>
+            </a:r>
+            <a:r>
+              <a:rPr lang="en-US" dirty="0" smtClean="0">
+                <a:latin typeface="Calibri" panose="020F0502020204030204" pitchFamily="34" charset="0"/>
+                <a:ea typeface="PMingLiU" panose="02020500000000000000" pitchFamily="18" charset="-120"/>
+                <a:cs typeface="Times New Roman" panose="02020603050405020304" pitchFamily="18" charset="0"/>
+              </a:rPr>
+              <a:t>t[k] </a:t>
+            </a:r>
+            <a:r>
+              <a:rPr lang="en-US" dirty="0">
+                <a:latin typeface="Calibri" panose="020F0502020204030204" pitchFamily="34" charset="0"/>
+                <a:ea typeface="PMingLiU" panose="02020500000000000000" pitchFamily="18" charset="-120"/>
+                <a:cs typeface="Times New Roman" panose="02020603050405020304" pitchFamily="18" charset="0"/>
+              </a:rPr>
+              <a:t>= 1</a:t>
+            </a:r>
+          </a:p>
+          <a:p>
+            <a:pPr marL="342900" lvl="0" indent="-342900">
+              <a:lnSpc>
+                <a:spcPct val="107000"/>
+              </a:lnSpc>
+              <a:spcAft>
+                <a:spcPts val="600"/>
+              </a:spcAft>
+              <a:buFont typeface="+mj-lt"/>
+              <a:buAutoNum type="arabicPeriod"/>
+            </a:pPr>
+            <a:r>
+              <a:rPr lang="en-US" dirty="0">
+                <a:latin typeface="Calibri" panose="020F0502020204030204" pitchFamily="34" charset="0"/>
+                <a:ea typeface="PMingLiU" panose="02020500000000000000" pitchFamily="18" charset="-120"/>
+                <a:cs typeface="Times New Roman" panose="02020603050405020304" pitchFamily="18" charset="0"/>
+              </a:rPr>
+              <a:t>		total = total + </a:t>
+            </a:r>
+            <a:r>
+              <a:rPr lang="en-US" dirty="0" smtClean="0">
+                <a:latin typeface="Calibri" panose="020F0502020204030204" pitchFamily="34" charset="0"/>
+                <a:ea typeface="PMingLiU" panose="02020500000000000000" pitchFamily="18" charset="-120"/>
+                <a:cs typeface="Times New Roman" panose="02020603050405020304" pitchFamily="18" charset="0"/>
+              </a:rPr>
+              <a:t>profit[</a:t>
+            </a:r>
+            <a:r>
+              <a:rPr lang="en-US" dirty="0" err="1" smtClean="0">
+                <a:latin typeface="Calibri" panose="020F0502020204030204" pitchFamily="34" charset="0"/>
+                <a:ea typeface="PMingLiU" panose="02020500000000000000" pitchFamily="18" charset="-120"/>
+                <a:cs typeface="Times New Roman" panose="02020603050405020304" pitchFamily="18" charset="0"/>
+              </a:rPr>
+              <a:t>i</a:t>
+            </a:r>
+            <a:r>
+              <a:rPr lang="en-US" dirty="0" smtClean="0">
+                <a:latin typeface="Calibri" panose="020F0502020204030204" pitchFamily="34" charset="0"/>
+                <a:ea typeface="PMingLiU" panose="02020500000000000000" pitchFamily="18" charset="-120"/>
+                <a:cs typeface="Times New Roman" panose="02020603050405020304" pitchFamily="18" charset="0"/>
+              </a:rPr>
+              <a:t>]</a:t>
+            </a:r>
+            <a:endParaRPr lang="en-US" dirty="0">
+              <a:latin typeface="Calibri" panose="020F0502020204030204" pitchFamily="34" charset="0"/>
+              <a:ea typeface="PMingLiU" panose="02020500000000000000" pitchFamily="18" charset="-120"/>
+              <a:cs typeface="Times New Roman" panose="02020603050405020304" pitchFamily="18" charset="0"/>
+            </a:endParaRPr>
+          </a:p>
+          <a:p>
+            <a:pPr marL="342900" lvl="0" indent="-342900">
+              <a:lnSpc>
+                <a:spcPct val="107000"/>
+              </a:lnSpc>
+              <a:spcAft>
+                <a:spcPts val="600"/>
+              </a:spcAft>
+              <a:buFont typeface="+mj-lt"/>
+              <a:buAutoNum type="arabicPeriod"/>
+            </a:pPr>
+            <a:r>
+              <a:rPr lang="en-US" dirty="0">
+                <a:latin typeface="Calibri" panose="020F0502020204030204" pitchFamily="34" charset="0"/>
+                <a:ea typeface="PMingLiU" panose="02020500000000000000" pitchFamily="18" charset="-120"/>
+                <a:cs typeface="Times New Roman" panose="02020603050405020304" pitchFamily="18" charset="0"/>
+              </a:rPr>
+              <a:t>	else</a:t>
+            </a:r>
+          </a:p>
+          <a:p>
+            <a:pPr marL="342900" lvl="0" indent="-342900">
+              <a:lnSpc>
+                <a:spcPct val="107000"/>
+              </a:lnSpc>
+              <a:spcAft>
+                <a:spcPts val="600"/>
+              </a:spcAft>
+              <a:buFont typeface="+mj-lt"/>
+              <a:buAutoNum type="arabicPeriod"/>
+            </a:pPr>
+            <a:r>
+              <a:rPr lang="en-US" dirty="0">
+                <a:latin typeface="Calibri" panose="020F0502020204030204" pitchFamily="34" charset="0"/>
+                <a:ea typeface="PMingLiU" panose="02020500000000000000" pitchFamily="18" charset="-120"/>
+                <a:cs typeface="Times New Roman" panose="02020603050405020304" pitchFamily="18" charset="0"/>
+              </a:rPr>
+              <a:t>		continue</a:t>
+            </a:r>
+          </a:p>
+        </p:txBody>
+      </p:sp>
+    </p:spTree>
+    <p:extLst>
+      <p:ext uri="{BB962C8B-B14F-4D97-AF65-F5344CB8AC3E}">
+        <p14:creationId xmlns:p14="http://schemas.microsoft.com/office/powerpoint/2010/main" val="3709991712"/>
+      </p:ext>
+    </p:extLst>
+  </p:cSld>
+  <p:clrMapOvr>
+    <a:masterClrMapping/>
+  </p:clrMapOvr>
+  <p:timing>
+    <p:tnLst>
+      <p:par>
+        <p:cTn id="1" dur="indefinite" restart="never" nodeType="tmRoot"/>
+      </p:par>
+    </p:tnLst>
+  </p:timing>
+</p:sld>
+</file>
+
+<file path=ppt/slides/slide29.xml><?xml version="1.0" encoding="utf-8"?>
+<p:sld xmlns:a="http://schemas.openxmlformats.org/drawingml/2006/main" xmlns:r="http://schemas.openxmlformats.org/officeDocument/2006/relationships" xmlns:p="http://schemas.openxmlformats.org/presentationml/2006/main">
+  <p:cSld>
+    <p:spTree>
+      <p:nvGrpSpPr>
+        <p:cNvPr id="1" name=""/>
+        <p:cNvGrpSpPr/>
+        <p:nvPr/>
+      </p:nvGrpSpPr>
+      <p:grpSpPr>
+        <a:xfrm>
+          <a:off x="0" y="0"/>
+          <a:ext cx="0" cy="0"/>
+          <a:chOff x="0" y="0"/>
+          <a:chExt cx="0" cy="0"/>
+        </a:xfrm>
+      </p:grpSpPr>
+      <p:sp>
+        <p:nvSpPr>
+          <p:cNvPr id="2" name="Title 1"/>
+          <p:cNvSpPr>
+            <a:spLocks noGrp="1"/>
+          </p:cNvSpPr>
+          <p:nvPr>
+            <p:ph type="title"/>
+          </p:nvPr>
+        </p:nvSpPr>
+        <p:spPr/>
+        <p:txBody>
+          <a:bodyPr/>
+          <a:lstStyle/>
+          <a:p>
+            <a:r>
+              <a:rPr lang="en-US" dirty="0" smtClean="0"/>
+              <a:t>Homework for May 2</a:t>
+            </a:r>
+            <a:r>
+              <a:rPr lang="en-US" baseline="30000" dirty="0" smtClean="0"/>
+              <a:t>nd</a:t>
+            </a:r>
+            <a:r>
+              <a:rPr lang="en-US" dirty="0" smtClean="0"/>
+              <a:t> 2017</a:t>
+            </a:r>
+            <a:endParaRPr lang="en-US" dirty="0"/>
+          </a:p>
+        </p:txBody>
+      </p:sp>
+      <p:sp>
+        <p:nvSpPr>
+          <p:cNvPr id="3" name="Content Placeholder 2"/>
+          <p:cNvSpPr>
+            <a:spLocks noGrp="1"/>
+          </p:cNvSpPr>
+          <p:nvPr>
+            <p:ph idx="1"/>
+          </p:nvPr>
+        </p:nvSpPr>
+        <p:spPr/>
+        <p:txBody>
+          <a:bodyPr>
+            <a:normAutofit fontScale="92500" lnSpcReduction="10000"/>
+          </a:bodyPr>
+          <a:lstStyle/>
+          <a:p>
+            <a:r>
+              <a:rPr lang="en-US" dirty="0" smtClean="0"/>
+              <a:t>Continue to implement job sequencing algorithm in C/C++ from:</a:t>
+            </a:r>
+          </a:p>
+          <a:p>
+            <a:pPr lvl="1"/>
+            <a:r>
+              <a:rPr lang="en-US" dirty="0" smtClean="0"/>
+              <a:t>Your pseudocode</a:t>
+            </a:r>
+          </a:p>
+          <a:p>
+            <a:pPr lvl="1"/>
+            <a:r>
+              <a:rPr lang="en-US" dirty="0" smtClean="0"/>
+              <a:t>Your friend’s pseudocode</a:t>
+            </a:r>
+          </a:p>
+          <a:p>
+            <a:pPr lvl="1"/>
+            <a:r>
+              <a:rPr lang="en-US" dirty="0" smtClean="0"/>
+              <a:t>Please give evaluation about the correctness of your and your friend’s algorithm</a:t>
+            </a:r>
+          </a:p>
+          <a:p>
+            <a:r>
+              <a:rPr lang="en-US" dirty="0" smtClean="0"/>
+              <a:t>Please collect the hardcopy:</a:t>
+            </a:r>
+          </a:p>
+        </p:txBody>
+      </p:sp>
+    </p:spTree>
+    <p:extLst>
+      <p:ext uri="{BB962C8B-B14F-4D97-AF65-F5344CB8AC3E}">
+        <p14:creationId xmlns:p14="http://schemas.microsoft.com/office/powerpoint/2010/main" val="2717028981"/>
+      </p:ext>
+    </p:extLst>
+  </p:cSld>
+  <p:clrMapOvr>
+    <a:masterClrMapping/>
+  </p:clrMapOvr>
+  <p:timing>
+    <p:tnLst>
+      <p:par>
+        <p:cTn id="1" dur="indefinite" restart="never" nodeType="tmRoot"/>
+      </p:par>
+    </p:tnLst>
+  </p:timing>
+</p:sld>
+</file>
+
+<file path=ppt/slides/slide3.xml><?xml version="1.0" encoding="utf-8"?>
+<p:sld xmlns:a="http://schemas.openxmlformats.org/drawingml/2006/main" xmlns:r="http://schemas.openxmlformats.org/officeDocument/2006/relationships" xmlns:p="http://schemas.openxmlformats.org/presentationml/2006/main" showMasterPhAnim="0">
+  <p:cSld>
+    <p:spTree>
+      <p:nvGrpSpPr>
+        <p:cNvPr id="1" name=""/>
+        <p:cNvGrpSpPr/>
+        <p:nvPr/>
+      </p:nvGrpSpPr>
+      <p:grpSpPr>
+        <a:xfrm>
+          <a:off x="0" y="0"/>
+          <a:ext cx="0" cy="0"/>
+          <a:chOff x="0" y="0"/>
+          <a:chExt cx="0" cy="0"/>
+        </a:xfrm>
+      </p:grpSpPr>
+      <p:sp>
+        <p:nvSpPr>
+          <p:cNvPr id="51205" name="Rectangle 5"/>
+          <p:cNvSpPr>
+            <a:spLocks noGrp="1" noChangeArrowheads="1"/>
+          </p:cNvSpPr>
+          <p:nvPr>
+            <p:ph type="title"/>
+          </p:nvPr>
+        </p:nvSpPr>
+        <p:spPr/>
+        <p:txBody>
+          <a:bodyPr/>
+          <a:lstStyle/>
+          <a:p>
+            <a:r>
+              <a:rPr lang="en-US"/>
+              <a:t>A short list of categories</a:t>
+            </a:r>
+          </a:p>
+        </p:txBody>
+      </p:sp>
+      <p:sp>
+        <p:nvSpPr>
+          <p:cNvPr id="51206" name="Rectangle 6"/>
+          <p:cNvSpPr>
+            <a:spLocks noGrp="1" noChangeArrowheads="1"/>
+          </p:cNvSpPr>
+          <p:nvPr>
+            <p:ph type="body" idx="1"/>
+          </p:nvPr>
+        </p:nvSpPr>
+        <p:spPr/>
+        <p:txBody>
+          <a:bodyPr>
+            <a:normAutofit fontScale="77500" lnSpcReduction="20000"/>
+          </a:bodyPr>
+          <a:lstStyle/>
+          <a:p>
+            <a:r>
+              <a:rPr lang="en-US" dirty="0"/>
+              <a:t>Algorithm types we will consider include:</a:t>
+            </a:r>
+          </a:p>
+          <a:p>
+            <a:pPr lvl="1"/>
+            <a:r>
+              <a:rPr lang="en-US" b="1" dirty="0">
+                <a:solidFill>
+                  <a:srgbClr val="0070C0"/>
+                </a:solidFill>
+              </a:rPr>
+              <a:t>Simple recursive algorithms</a:t>
+            </a:r>
+          </a:p>
+          <a:p>
+            <a:pPr lvl="1"/>
+            <a:r>
+              <a:rPr lang="en-US" dirty="0"/>
+              <a:t>Backtracking algorithms</a:t>
+            </a:r>
+          </a:p>
+          <a:p>
+            <a:pPr lvl="1"/>
+            <a:r>
+              <a:rPr lang="en-US" b="1" dirty="0">
+                <a:solidFill>
+                  <a:srgbClr val="0070C0"/>
+                </a:solidFill>
+              </a:rPr>
+              <a:t>Divide and conquer algorithms</a:t>
+            </a:r>
+          </a:p>
+          <a:p>
+            <a:pPr lvl="1"/>
+            <a:r>
+              <a:rPr lang="en-US" b="1" dirty="0">
+                <a:solidFill>
+                  <a:srgbClr val="0070C0"/>
+                </a:solidFill>
+              </a:rPr>
+              <a:t>Dynamic programming algorithms</a:t>
+            </a:r>
+          </a:p>
+          <a:p>
+            <a:pPr lvl="1"/>
+            <a:r>
+              <a:rPr lang="en-US" b="1" dirty="0">
+                <a:solidFill>
+                  <a:srgbClr val="0070C0"/>
+                </a:solidFill>
+              </a:rPr>
+              <a:t>Greedy algorithms</a:t>
+            </a:r>
+          </a:p>
+          <a:p>
+            <a:pPr lvl="1"/>
+            <a:r>
+              <a:rPr lang="en-US" dirty="0"/>
+              <a:t>Branch and bound algorithms</a:t>
+            </a:r>
+          </a:p>
+          <a:p>
+            <a:pPr lvl="1"/>
+            <a:r>
+              <a:rPr lang="en-US" b="1" dirty="0">
+                <a:solidFill>
+                  <a:srgbClr val="0070C0"/>
+                </a:solidFill>
+              </a:rPr>
+              <a:t>Brute force algorithms</a:t>
+            </a:r>
+          </a:p>
+          <a:p>
+            <a:pPr lvl="1"/>
+            <a:r>
+              <a:rPr lang="en-US" dirty="0"/>
+              <a:t>Randomized algorithms</a:t>
+            </a:r>
+          </a:p>
+        </p:txBody>
+      </p:sp>
+    </p:spTree>
+    <p:extLst>
+      <p:ext uri="{BB962C8B-B14F-4D97-AF65-F5344CB8AC3E}">
+        <p14:creationId xmlns:p14="http://schemas.microsoft.com/office/powerpoint/2010/main" val="583848545"/>
+      </p:ext>
+    </p:extLst>
+  </p:cSld>
+  <p:clrMapOvr>
+    <a:masterClrMapping/>
+  </p:clrMapOvr>
+  <p:timing>
+    <p:tnLst>
+      <p:par>
+        <p:cTn id="1" dur="indefinite" restart="never" nodeType="tmRoot">
+          <p:childTnLst>
+            <p:seq concurrent="1" nextAc="seek">
+              <p:cTn id="2" dur="indefinite" nodeType="mainSeq">
+                <p:childTnLst>
+                  <p:par>
+                    <p:cTn id="3" fill="hold" nodeType="clickPar">
+                      <p:stCondLst>
+                        <p:cond delay="indefinite"/>
+                      </p:stCondLst>
+                      <p:childTnLst>
+                        <p:par>
+                          <p:cTn id="4" fill="hold" nodeType="withGroup">
+                            <p:stCondLst>
+                              <p:cond delay="0"/>
+                            </p:stCondLst>
+                            <p:childTnLst>
+                              <p:par>
+                                <p:cTn id="5" presetID="22" presetClass="entr" presetSubtype="8" fill="hold" grpId="0" nodeType="clickEffect">
+                                  <p:stCondLst>
+                                    <p:cond delay="0"/>
+                                  </p:stCondLst>
+                                  <p:childTnLst>
+                                    <p:set>
+                                      <p:cBhvr>
+                                        <p:cTn id="6" dur="1" fill="hold">
+                                          <p:stCondLst>
+                                            <p:cond delay="0"/>
+                                          </p:stCondLst>
+                                        </p:cTn>
+                                        <p:tgtEl>
+                                          <p:spTgt spid="51206">
+                                            <p:txEl>
+                                              <p:pRg st="0" end="0"/>
+                                            </p:txEl>
+                                          </p:spTgt>
+                                        </p:tgtEl>
+                                        <p:attrNameLst>
+                                          <p:attrName>style.visibility</p:attrName>
+                                        </p:attrNameLst>
+                                      </p:cBhvr>
+                                      <p:to>
+                                        <p:strVal val="visible"/>
+                                      </p:to>
+                                    </p:set>
+                                    <p:animEffect transition="in" filter="wipe(left)">
+                                      <p:cBhvr>
+                                        <p:cTn id="7" dur="500"/>
+                                        <p:tgtEl>
+                                          <p:spTgt spid="51206">
+                                            <p:txEl>
+                                              <p:pRg st="0" end="0"/>
+                                            </p:txEl>
+                                          </p:spTgt>
+                                        </p:tgtEl>
+                                      </p:cBhvr>
+                                    </p:animEffect>
+                                  </p:childTnLst>
+                                </p:cTn>
+                              </p:par>
+                              <p:par>
+                                <p:cTn id="8" presetID="22" presetClass="entr" presetSubtype="8" fill="hold" grpId="0" nodeType="withEffect">
+                                  <p:stCondLst>
+                                    <p:cond delay="0"/>
+                                  </p:stCondLst>
+                                  <p:childTnLst>
+                                    <p:set>
+                                      <p:cBhvr>
+                                        <p:cTn id="9" dur="1" fill="hold">
+                                          <p:stCondLst>
+                                            <p:cond delay="0"/>
+                                          </p:stCondLst>
+                                        </p:cTn>
+                                        <p:tgtEl>
+                                          <p:spTgt spid="51206">
+                                            <p:txEl>
+                                              <p:pRg st="1" end="1"/>
+                                            </p:txEl>
+                                          </p:spTgt>
+                                        </p:tgtEl>
+                                        <p:attrNameLst>
+                                          <p:attrName>style.visibility</p:attrName>
+                                        </p:attrNameLst>
+                                      </p:cBhvr>
+                                      <p:to>
+                                        <p:strVal val="visible"/>
+                                      </p:to>
+                                    </p:set>
+                                    <p:animEffect transition="in" filter="wipe(left)">
+                                      <p:cBhvr>
+                                        <p:cTn id="10" dur="500"/>
+                                        <p:tgtEl>
+                                          <p:spTgt spid="51206">
+                                            <p:txEl>
+                                              <p:pRg st="1" end="1"/>
+                                            </p:txEl>
+                                          </p:spTgt>
+                                        </p:tgtEl>
+                                      </p:cBhvr>
+                                    </p:animEffect>
+                                  </p:childTnLst>
+                                </p:cTn>
+                              </p:par>
+                              <p:par>
+                                <p:cTn id="11" presetID="22" presetClass="entr" presetSubtype="8" fill="hold" grpId="0" nodeType="withEffect">
+                                  <p:stCondLst>
+                                    <p:cond delay="0"/>
+                                  </p:stCondLst>
+                                  <p:childTnLst>
+                                    <p:set>
+                                      <p:cBhvr>
+                                        <p:cTn id="12" dur="1" fill="hold">
+                                          <p:stCondLst>
+                                            <p:cond delay="0"/>
+                                          </p:stCondLst>
+                                        </p:cTn>
+                                        <p:tgtEl>
+                                          <p:spTgt spid="51206">
+                                            <p:txEl>
+                                              <p:pRg st="2" end="2"/>
+                                            </p:txEl>
+                                          </p:spTgt>
+                                        </p:tgtEl>
+                                        <p:attrNameLst>
+                                          <p:attrName>style.visibility</p:attrName>
+                                        </p:attrNameLst>
+                                      </p:cBhvr>
+                                      <p:to>
+                                        <p:strVal val="visible"/>
+                                      </p:to>
+                                    </p:set>
+                                    <p:animEffect transition="in" filter="wipe(left)">
+                                      <p:cBhvr>
+                                        <p:cTn id="13" dur="500"/>
+                                        <p:tgtEl>
+                                          <p:spTgt spid="51206">
+                                            <p:txEl>
+                                              <p:pRg st="2" end="2"/>
+                                            </p:txEl>
+                                          </p:spTgt>
+                                        </p:tgtEl>
+                                      </p:cBhvr>
+                                    </p:animEffect>
+                                  </p:childTnLst>
+                                </p:cTn>
+                              </p:par>
+                              <p:par>
+                                <p:cTn id="14" presetID="22" presetClass="entr" presetSubtype="8" fill="hold" grpId="0" nodeType="withEffect">
+                                  <p:stCondLst>
+                                    <p:cond delay="0"/>
+                                  </p:stCondLst>
+                                  <p:childTnLst>
+                                    <p:set>
+                                      <p:cBhvr>
+                                        <p:cTn id="15" dur="1" fill="hold">
+                                          <p:stCondLst>
+                                            <p:cond delay="0"/>
+                                          </p:stCondLst>
+                                        </p:cTn>
+                                        <p:tgtEl>
+                                          <p:spTgt spid="51206">
+                                            <p:txEl>
+                                              <p:pRg st="3" end="3"/>
+                                            </p:txEl>
+                                          </p:spTgt>
+                                        </p:tgtEl>
+                                        <p:attrNameLst>
+                                          <p:attrName>style.visibility</p:attrName>
+                                        </p:attrNameLst>
+                                      </p:cBhvr>
+                                      <p:to>
+                                        <p:strVal val="visible"/>
+                                      </p:to>
+                                    </p:set>
+                                    <p:animEffect transition="in" filter="wipe(left)">
+                                      <p:cBhvr>
+                                        <p:cTn id="16" dur="500"/>
+                                        <p:tgtEl>
+                                          <p:spTgt spid="51206">
+                                            <p:txEl>
+                                              <p:pRg st="3" end="3"/>
+                                            </p:txEl>
+                                          </p:spTgt>
+                                        </p:tgtEl>
+                                      </p:cBhvr>
+                                    </p:animEffect>
+                                  </p:childTnLst>
+                                </p:cTn>
+                              </p:par>
+                              <p:par>
+                                <p:cTn id="17" presetID="22" presetClass="entr" presetSubtype="8" fill="hold" grpId="0" nodeType="withEffect">
+                                  <p:stCondLst>
+                                    <p:cond delay="0"/>
+                                  </p:stCondLst>
+                                  <p:childTnLst>
+                                    <p:set>
+                                      <p:cBhvr>
+                                        <p:cTn id="18" dur="1" fill="hold">
+                                          <p:stCondLst>
+                                            <p:cond delay="0"/>
+                                          </p:stCondLst>
+                                        </p:cTn>
+                                        <p:tgtEl>
+                                          <p:spTgt spid="51206">
+                                            <p:txEl>
+                                              <p:pRg st="4" end="4"/>
+                                            </p:txEl>
+                                          </p:spTgt>
+                                        </p:tgtEl>
+                                        <p:attrNameLst>
+                                          <p:attrName>style.visibility</p:attrName>
+                                        </p:attrNameLst>
+                                      </p:cBhvr>
+                                      <p:to>
+                                        <p:strVal val="visible"/>
+                                      </p:to>
+                                    </p:set>
+                                    <p:animEffect transition="in" filter="wipe(left)">
+                                      <p:cBhvr>
+                                        <p:cTn id="19" dur="500"/>
+                                        <p:tgtEl>
+                                          <p:spTgt spid="51206">
+                                            <p:txEl>
+                                              <p:pRg st="4" end="4"/>
+                                            </p:txEl>
+                                          </p:spTgt>
+                                        </p:tgtEl>
+                                      </p:cBhvr>
+                                    </p:animEffect>
+                                  </p:childTnLst>
+                                </p:cTn>
+                              </p:par>
+                              <p:par>
+                                <p:cTn id="20" presetID="22" presetClass="entr" presetSubtype="8" fill="hold" grpId="0" nodeType="withEffect">
+                                  <p:stCondLst>
+                                    <p:cond delay="0"/>
+                                  </p:stCondLst>
+                                  <p:childTnLst>
+                                    <p:set>
+                                      <p:cBhvr>
+                                        <p:cTn id="21" dur="1" fill="hold">
+                                          <p:stCondLst>
+                                            <p:cond delay="0"/>
+                                          </p:stCondLst>
+                                        </p:cTn>
+                                        <p:tgtEl>
+                                          <p:spTgt spid="51206">
+                                            <p:txEl>
+                                              <p:pRg st="5" end="5"/>
+                                            </p:txEl>
+                                          </p:spTgt>
+                                        </p:tgtEl>
+                                        <p:attrNameLst>
+                                          <p:attrName>style.visibility</p:attrName>
+                                        </p:attrNameLst>
+                                      </p:cBhvr>
+                                      <p:to>
+                                        <p:strVal val="visible"/>
+                                      </p:to>
+                                    </p:set>
+                                    <p:animEffect transition="in" filter="wipe(left)">
+                                      <p:cBhvr>
+                                        <p:cTn id="22" dur="500"/>
+                                        <p:tgtEl>
+                                          <p:spTgt spid="51206">
+                                            <p:txEl>
+                                              <p:pRg st="5" end="5"/>
+                                            </p:txEl>
+                                          </p:spTgt>
+                                        </p:tgtEl>
+                                      </p:cBhvr>
+                                    </p:animEffect>
+                                  </p:childTnLst>
+                                </p:cTn>
+                              </p:par>
+                              <p:par>
+                                <p:cTn id="23" presetID="22" presetClass="entr" presetSubtype="8" fill="hold" grpId="0" nodeType="withEffect">
+                                  <p:stCondLst>
+                                    <p:cond delay="0"/>
+                                  </p:stCondLst>
+                                  <p:childTnLst>
+                                    <p:set>
+                                      <p:cBhvr>
+                                        <p:cTn id="24" dur="1" fill="hold">
+                                          <p:stCondLst>
+                                            <p:cond delay="0"/>
+                                          </p:stCondLst>
+                                        </p:cTn>
+                                        <p:tgtEl>
+                                          <p:spTgt spid="51206">
+                                            <p:txEl>
+                                              <p:pRg st="6" end="6"/>
+                                            </p:txEl>
+                                          </p:spTgt>
+                                        </p:tgtEl>
+                                        <p:attrNameLst>
+                                          <p:attrName>style.visibility</p:attrName>
+                                        </p:attrNameLst>
+                                      </p:cBhvr>
+                                      <p:to>
+                                        <p:strVal val="visible"/>
+                                      </p:to>
+                                    </p:set>
+                                    <p:animEffect transition="in" filter="wipe(left)">
+                                      <p:cBhvr>
+                                        <p:cTn id="25" dur="500"/>
+                                        <p:tgtEl>
+                                          <p:spTgt spid="51206">
+                                            <p:txEl>
+                                              <p:pRg st="6" end="6"/>
+                                            </p:txEl>
+                                          </p:spTgt>
+                                        </p:tgtEl>
+                                      </p:cBhvr>
+                                    </p:animEffect>
+                                  </p:childTnLst>
+                                </p:cTn>
+                              </p:par>
+                              <p:par>
+                                <p:cTn id="26" presetID="22" presetClass="entr" presetSubtype="8" fill="hold" grpId="0" nodeType="withEffect">
+                                  <p:stCondLst>
+                                    <p:cond delay="0"/>
+                                  </p:stCondLst>
+                                  <p:childTnLst>
+                                    <p:set>
+                                      <p:cBhvr>
+                                        <p:cTn id="27" dur="1" fill="hold">
+                                          <p:stCondLst>
+                                            <p:cond delay="0"/>
+                                          </p:stCondLst>
+                                        </p:cTn>
+                                        <p:tgtEl>
+                                          <p:spTgt spid="51206">
+                                            <p:txEl>
+                                              <p:pRg st="7" end="7"/>
+                                            </p:txEl>
+                                          </p:spTgt>
+                                        </p:tgtEl>
+                                        <p:attrNameLst>
+                                          <p:attrName>style.visibility</p:attrName>
+                                        </p:attrNameLst>
+                                      </p:cBhvr>
+                                      <p:to>
+                                        <p:strVal val="visible"/>
+                                      </p:to>
+                                    </p:set>
+                                    <p:animEffect transition="in" filter="wipe(left)">
+                                      <p:cBhvr>
+                                        <p:cTn id="28" dur="500"/>
+                                        <p:tgtEl>
+                                          <p:spTgt spid="51206">
+                                            <p:txEl>
+                                              <p:pRg st="7" end="7"/>
+                                            </p:txEl>
+                                          </p:spTgt>
+                                        </p:tgtEl>
+                                      </p:cBhvr>
+                                    </p:animEffect>
+                                  </p:childTnLst>
+                                </p:cTn>
+                              </p:par>
+                              <p:par>
+                                <p:cTn id="29" presetID="22" presetClass="entr" presetSubtype="8" fill="hold" grpId="0" nodeType="withEffect">
+                                  <p:stCondLst>
+                                    <p:cond delay="0"/>
+                                  </p:stCondLst>
+                                  <p:childTnLst>
+                                    <p:set>
+                                      <p:cBhvr>
+                                        <p:cTn id="30" dur="1" fill="hold">
+                                          <p:stCondLst>
+                                            <p:cond delay="0"/>
+                                          </p:stCondLst>
+                                        </p:cTn>
+                                        <p:tgtEl>
+                                          <p:spTgt spid="51206">
+                                            <p:txEl>
+                                              <p:pRg st="8" end="8"/>
+                                            </p:txEl>
+                                          </p:spTgt>
+                                        </p:tgtEl>
+                                        <p:attrNameLst>
+                                          <p:attrName>style.visibility</p:attrName>
+                                        </p:attrNameLst>
+                                      </p:cBhvr>
+                                      <p:to>
+                                        <p:strVal val="visible"/>
+                                      </p:to>
+                                    </p:set>
+                                    <p:animEffect transition="in" filter="wipe(left)">
+                                      <p:cBhvr>
+                                        <p:cTn id="31" dur="500"/>
+                                        <p:tgtEl>
+                                          <p:spTgt spid="51206">
+                                            <p:txEl>
+                                              <p:pRg st="8" end="8"/>
+                                            </p:txEl>
+                                          </p:spTgt>
+                                        </p:tgtEl>
+                                      </p:cBhvr>
+                                    </p:animEffect>
+                                  </p:childTnLst>
+                                </p:cTn>
+                              </p:par>
+                            </p:childTnLst>
+                          </p:cTn>
+                        </p:par>
+                      </p:childTnLst>
+                    </p:cTn>
+                  </p:par>
+                </p:childTnLst>
+              </p:cTn>
+              <p:prevCondLst>
+                <p:cond evt="onPrev" delay="0">
+                  <p:tgtEl>
+                    <p:sldTgt/>
+                  </p:tgtEl>
+                </p:cond>
+              </p:prevCondLst>
+              <p:nextCondLst>
+                <p:cond evt="onNext" delay="0">
+                  <p:tgtEl>
+                    <p:sldTgt/>
+                  </p:tgtEl>
+                </p:cond>
+              </p:nextCondLst>
+            </p:seq>
+          </p:childTnLst>
+        </p:cTn>
+      </p:par>
+    </p:tnLst>
+    <p:bldLst>
+      <p:bldP spid="51206" grpId="0" build="p" autoUpdateAnimBg="0"/>
+    </p:bldLst>
+  </p:timing>
+</p:sld>
+</file>
+
+<file path=ppt/slides/slide30.xml><?xml version="1.0" encoding="utf-8"?>
 <p:sld xmlns:a="http://schemas.openxmlformats.org/drawingml/2006/main" xmlns:r="http://schemas.openxmlformats.org/officeDocument/2006/relationships" xmlns:p="http://schemas.openxmlformats.org/presentationml/2006/main">
   <p:cSld>
     <p:spTree>
@@ -19188,7 +20351,7 @@
 </p:sld>
 </file>
 
-<file path=ppt/slides/slide29.xml><?xml version="1.0" encoding="utf-8"?>
+<file path=ppt/slides/slide31.xml><?xml version="1.0" encoding="utf-8"?>
 <p:sld xmlns:a="http://schemas.openxmlformats.org/drawingml/2006/main" xmlns:r="http://schemas.openxmlformats.org/officeDocument/2006/relationships" xmlns:p="http://schemas.openxmlformats.org/presentationml/2006/main">
   <p:cSld>
     <p:spTree>
@@ -19844,597 +21007,7 @@
 </p:sld>
 </file>
 
-<file path=ppt/slides/slide3.xml><?xml version="1.0" encoding="utf-8"?>
-<p:sld xmlns:a="http://schemas.openxmlformats.org/drawingml/2006/main" xmlns:r="http://schemas.openxmlformats.org/officeDocument/2006/relationships" xmlns:p="http://schemas.openxmlformats.org/presentationml/2006/main" showMasterPhAnim="0">
-  <p:cSld>
-    <p:spTree>
-      <p:nvGrpSpPr>
-        <p:cNvPr id="1" name=""/>
-        <p:cNvGrpSpPr/>
-        <p:nvPr/>
-      </p:nvGrpSpPr>
-      <p:grpSpPr>
-        <a:xfrm>
-          <a:off x="0" y="0"/>
-          <a:ext cx="0" cy="0"/>
-          <a:chOff x="0" y="0"/>
-          <a:chExt cx="0" cy="0"/>
-        </a:xfrm>
-      </p:grpSpPr>
-      <p:sp>
-        <p:nvSpPr>
-          <p:cNvPr id="51205" name="Rectangle 5"/>
-          <p:cNvSpPr>
-            <a:spLocks noGrp="1" noChangeArrowheads="1"/>
-          </p:cNvSpPr>
-          <p:nvPr>
-            <p:ph type="title"/>
-          </p:nvPr>
-        </p:nvSpPr>
-        <p:spPr/>
-        <p:txBody>
-          <a:bodyPr/>
-          <a:lstStyle/>
-          <a:p>
-            <a:r>
-              <a:rPr lang="en-US"/>
-              <a:t>A short list of categories</a:t>
-            </a:r>
-          </a:p>
-        </p:txBody>
-      </p:sp>
-      <p:sp>
-        <p:nvSpPr>
-          <p:cNvPr id="51206" name="Rectangle 6"/>
-          <p:cNvSpPr>
-            <a:spLocks noGrp="1" noChangeArrowheads="1"/>
-          </p:cNvSpPr>
-          <p:nvPr>
-            <p:ph type="body" idx="1"/>
-          </p:nvPr>
-        </p:nvSpPr>
-        <p:spPr/>
-        <p:txBody>
-          <a:bodyPr>
-            <a:normAutofit fontScale="77500" lnSpcReduction="20000"/>
-          </a:bodyPr>
-          <a:lstStyle/>
-          <a:p>
-            <a:r>
-              <a:rPr lang="en-US" dirty="0"/>
-              <a:t>Algorithm types we will consider include:</a:t>
-            </a:r>
-          </a:p>
-          <a:p>
-            <a:pPr lvl="1"/>
-            <a:r>
-              <a:rPr lang="en-US" b="1" dirty="0">
-                <a:solidFill>
-                  <a:srgbClr val="0070C0"/>
-                </a:solidFill>
-              </a:rPr>
-              <a:t>Simple recursive algorithms</a:t>
-            </a:r>
-          </a:p>
-          <a:p>
-            <a:pPr lvl="1"/>
-            <a:r>
-              <a:rPr lang="en-US" dirty="0"/>
-              <a:t>Backtracking algorithms</a:t>
-            </a:r>
-          </a:p>
-          <a:p>
-            <a:pPr lvl="1"/>
-            <a:r>
-              <a:rPr lang="en-US" b="1" dirty="0">
-                <a:solidFill>
-                  <a:srgbClr val="0070C0"/>
-                </a:solidFill>
-              </a:rPr>
-              <a:t>Divide and conquer algorithms</a:t>
-            </a:r>
-          </a:p>
-          <a:p>
-            <a:pPr lvl="1"/>
-            <a:r>
-              <a:rPr lang="en-US" b="1" dirty="0">
-                <a:solidFill>
-                  <a:srgbClr val="0070C0"/>
-                </a:solidFill>
-              </a:rPr>
-              <a:t>Dynamic programming algorithms</a:t>
-            </a:r>
-          </a:p>
-          <a:p>
-            <a:pPr lvl="1"/>
-            <a:r>
-              <a:rPr lang="en-US" b="1" dirty="0">
-                <a:solidFill>
-                  <a:srgbClr val="0070C0"/>
-                </a:solidFill>
-              </a:rPr>
-              <a:t>Greedy algorithms</a:t>
-            </a:r>
-          </a:p>
-          <a:p>
-            <a:pPr lvl="1"/>
-            <a:r>
-              <a:rPr lang="en-US" dirty="0"/>
-              <a:t>Branch and bound algorithms</a:t>
-            </a:r>
-          </a:p>
-          <a:p>
-            <a:pPr lvl="1"/>
-            <a:r>
-              <a:rPr lang="en-US" b="1" dirty="0">
-                <a:solidFill>
-                  <a:srgbClr val="0070C0"/>
-                </a:solidFill>
-              </a:rPr>
-              <a:t>Brute force algorithms</a:t>
-            </a:r>
-          </a:p>
-          <a:p>
-            <a:pPr lvl="1"/>
-            <a:r>
-              <a:rPr lang="en-US" dirty="0"/>
-              <a:t>Randomized algorithms</a:t>
-            </a:r>
-          </a:p>
-        </p:txBody>
-      </p:sp>
-    </p:spTree>
-    <p:extLst>
-      <p:ext uri="{BB962C8B-B14F-4D97-AF65-F5344CB8AC3E}">
-        <p14:creationId xmlns:p14="http://schemas.microsoft.com/office/powerpoint/2010/main" val="583848545"/>
-      </p:ext>
-    </p:extLst>
-  </p:cSld>
-  <p:clrMapOvr>
-    <a:masterClrMapping/>
-  </p:clrMapOvr>
-  <p:timing>
-    <p:tnLst>
-      <p:par>
-        <p:cTn id="1" dur="indefinite" restart="never" nodeType="tmRoot">
-          <p:childTnLst>
-            <p:seq concurrent="1" nextAc="seek">
-              <p:cTn id="2" dur="indefinite" nodeType="mainSeq">
-                <p:childTnLst>
-                  <p:par>
-                    <p:cTn id="3" fill="hold" nodeType="clickPar">
-                      <p:stCondLst>
-                        <p:cond delay="indefinite"/>
-                      </p:stCondLst>
-                      <p:childTnLst>
-                        <p:par>
-                          <p:cTn id="4" fill="hold" nodeType="withGroup">
-                            <p:stCondLst>
-                              <p:cond delay="0"/>
-                            </p:stCondLst>
-                            <p:childTnLst>
-                              <p:par>
-                                <p:cTn id="5" presetID="22" presetClass="entr" presetSubtype="8" fill="hold" grpId="0" nodeType="clickEffect">
-                                  <p:stCondLst>
-                                    <p:cond delay="0"/>
-                                  </p:stCondLst>
-                                  <p:childTnLst>
-                                    <p:set>
-                                      <p:cBhvr>
-                                        <p:cTn id="6" dur="1" fill="hold">
-                                          <p:stCondLst>
-                                            <p:cond delay="0"/>
-                                          </p:stCondLst>
-                                        </p:cTn>
-                                        <p:tgtEl>
-                                          <p:spTgt spid="51206">
-                                            <p:txEl>
-                                              <p:pRg st="0" end="0"/>
-                                            </p:txEl>
-                                          </p:spTgt>
-                                        </p:tgtEl>
-                                        <p:attrNameLst>
-                                          <p:attrName>style.visibility</p:attrName>
-                                        </p:attrNameLst>
-                                      </p:cBhvr>
-                                      <p:to>
-                                        <p:strVal val="visible"/>
-                                      </p:to>
-                                    </p:set>
-                                    <p:animEffect transition="in" filter="wipe(left)">
-                                      <p:cBhvr>
-                                        <p:cTn id="7" dur="500"/>
-                                        <p:tgtEl>
-                                          <p:spTgt spid="51206">
-                                            <p:txEl>
-                                              <p:pRg st="0" end="0"/>
-                                            </p:txEl>
-                                          </p:spTgt>
-                                        </p:tgtEl>
-                                      </p:cBhvr>
-                                    </p:animEffect>
-                                  </p:childTnLst>
-                                </p:cTn>
-                              </p:par>
-                              <p:par>
-                                <p:cTn id="8" presetID="22" presetClass="entr" presetSubtype="8" fill="hold" grpId="0" nodeType="withEffect">
-                                  <p:stCondLst>
-                                    <p:cond delay="0"/>
-                                  </p:stCondLst>
-                                  <p:childTnLst>
-                                    <p:set>
-                                      <p:cBhvr>
-                                        <p:cTn id="9" dur="1" fill="hold">
-                                          <p:stCondLst>
-                                            <p:cond delay="0"/>
-                                          </p:stCondLst>
-                                        </p:cTn>
-                                        <p:tgtEl>
-                                          <p:spTgt spid="51206">
-                                            <p:txEl>
-                                              <p:pRg st="1" end="1"/>
-                                            </p:txEl>
-                                          </p:spTgt>
-                                        </p:tgtEl>
-                                        <p:attrNameLst>
-                                          <p:attrName>style.visibility</p:attrName>
-                                        </p:attrNameLst>
-                                      </p:cBhvr>
-                                      <p:to>
-                                        <p:strVal val="visible"/>
-                                      </p:to>
-                                    </p:set>
-                                    <p:animEffect transition="in" filter="wipe(left)">
-                                      <p:cBhvr>
-                                        <p:cTn id="10" dur="500"/>
-                                        <p:tgtEl>
-                                          <p:spTgt spid="51206">
-                                            <p:txEl>
-                                              <p:pRg st="1" end="1"/>
-                                            </p:txEl>
-                                          </p:spTgt>
-                                        </p:tgtEl>
-                                      </p:cBhvr>
-                                    </p:animEffect>
-                                  </p:childTnLst>
-                                </p:cTn>
-                              </p:par>
-                              <p:par>
-                                <p:cTn id="11" presetID="22" presetClass="entr" presetSubtype="8" fill="hold" grpId="0" nodeType="withEffect">
-                                  <p:stCondLst>
-                                    <p:cond delay="0"/>
-                                  </p:stCondLst>
-                                  <p:childTnLst>
-                                    <p:set>
-                                      <p:cBhvr>
-                                        <p:cTn id="12" dur="1" fill="hold">
-                                          <p:stCondLst>
-                                            <p:cond delay="0"/>
-                                          </p:stCondLst>
-                                        </p:cTn>
-                                        <p:tgtEl>
-                                          <p:spTgt spid="51206">
-                                            <p:txEl>
-                                              <p:pRg st="2" end="2"/>
-                                            </p:txEl>
-                                          </p:spTgt>
-                                        </p:tgtEl>
-                                        <p:attrNameLst>
-                                          <p:attrName>style.visibility</p:attrName>
-                                        </p:attrNameLst>
-                                      </p:cBhvr>
-                                      <p:to>
-                                        <p:strVal val="visible"/>
-                                      </p:to>
-                                    </p:set>
-                                    <p:animEffect transition="in" filter="wipe(left)">
-                                      <p:cBhvr>
-                                        <p:cTn id="13" dur="500"/>
-                                        <p:tgtEl>
-                                          <p:spTgt spid="51206">
-                                            <p:txEl>
-                                              <p:pRg st="2" end="2"/>
-                                            </p:txEl>
-                                          </p:spTgt>
-                                        </p:tgtEl>
-                                      </p:cBhvr>
-                                    </p:animEffect>
-                                  </p:childTnLst>
-                                </p:cTn>
-                              </p:par>
-                              <p:par>
-                                <p:cTn id="14" presetID="22" presetClass="entr" presetSubtype="8" fill="hold" grpId="0" nodeType="withEffect">
-                                  <p:stCondLst>
-                                    <p:cond delay="0"/>
-                                  </p:stCondLst>
-                                  <p:childTnLst>
-                                    <p:set>
-                                      <p:cBhvr>
-                                        <p:cTn id="15" dur="1" fill="hold">
-                                          <p:stCondLst>
-                                            <p:cond delay="0"/>
-                                          </p:stCondLst>
-                                        </p:cTn>
-                                        <p:tgtEl>
-                                          <p:spTgt spid="51206">
-                                            <p:txEl>
-                                              <p:pRg st="3" end="3"/>
-                                            </p:txEl>
-                                          </p:spTgt>
-                                        </p:tgtEl>
-                                        <p:attrNameLst>
-                                          <p:attrName>style.visibility</p:attrName>
-                                        </p:attrNameLst>
-                                      </p:cBhvr>
-                                      <p:to>
-                                        <p:strVal val="visible"/>
-                                      </p:to>
-                                    </p:set>
-                                    <p:animEffect transition="in" filter="wipe(left)">
-                                      <p:cBhvr>
-                                        <p:cTn id="16" dur="500"/>
-                                        <p:tgtEl>
-                                          <p:spTgt spid="51206">
-                                            <p:txEl>
-                                              <p:pRg st="3" end="3"/>
-                                            </p:txEl>
-                                          </p:spTgt>
-                                        </p:tgtEl>
-                                      </p:cBhvr>
-                                    </p:animEffect>
-                                  </p:childTnLst>
-                                </p:cTn>
-                              </p:par>
-                              <p:par>
-                                <p:cTn id="17" presetID="22" presetClass="entr" presetSubtype="8" fill="hold" grpId="0" nodeType="withEffect">
-                                  <p:stCondLst>
-                                    <p:cond delay="0"/>
-                                  </p:stCondLst>
-                                  <p:childTnLst>
-                                    <p:set>
-                                      <p:cBhvr>
-                                        <p:cTn id="18" dur="1" fill="hold">
-                                          <p:stCondLst>
-                                            <p:cond delay="0"/>
-                                          </p:stCondLst>
-                                        </p:cTn>
-                                        <p:tgtEl>
-                                          <p:spTgt spid="51206">
-                                            <p:txEl>
-                                              <p:pRg st="4" end="4"/>
-                                            </p:txEl>
-                                          </p:spTgt>
-                                        </p:tgtEl>
-                                        <p:attrNameLst>
-                                          <p:attrName>style.visibility</p:attrName>
-                                        </p:attrNameLst>
-                                      </p:cBhvr>
-                                      <p:to>
-                                        <p:strVal val="visible"/>
-                                      </p:to>
-                                    </p:set>
-                                    <p:animEffect transition="in" filter="wipe(left)">
-                                      <p:cBhvr>
-                                        <p:cTn id="19" dur="500"/>
-                                        <p:tgtEl>
-                                          <p:spTgt spid="51206">
-                                            <p:txEl>
-                                              <p:pRg st="4" end="4"/>
-                                            </p:txEl>
-                                          </p:spTgt>
-                                        </p:tgtEl>
-                                      </p:cBhvr>
-                                    </p:animEffect>
-                                  </p:childTnLst>
-                                </p:cTn>
-                              </p:par>
-                              <p:par>
-                                <p:cTn id="20" presetID="22" presetClass="entr" presetSubtype="8" fill="hold" grpId="0" nodeType="withEffect">
-                                  <p:stCondLst>
-                                    <p:cond delay="0"/>
-                                  </p:stCondLst>
-                                  <p:childTnLst>
-                                    <p:set>
-                                      <p:cBhvr>
-                                        <p:cTn id="21" dur="1" fill="hold">
-                                          <p:stCondLst>
-                                            <p:cond delay="0"/>
-                                          </p:stCondLst>
-                                        </p:cTn>
-                                        <p:tgtEl>
-                                          <p:spTgt spid="51206">
-                                            <p:txEl>
-                                              <p:pRg st="5" end="5"/>
-                                            </p:txEl>
-                                          </p:spTgt>
-                                        </p:tgtEl>
-                                        <p:attrNameLst>
-                                          <p:attrName>style.visibility</p:attrName>
-                                        </p:attrNameLst>
-                                      </p:cBhvr>
-                                      <p:to>
-                                        <p:strVal val="visible"/>
-                                      </p:to>
-                                    </p:set>
-                                    <p:animEffect transition="in" filter="wipe(left)">
-                                      <p:cBhvr>
-                                        <p:cTn id="22" dur="500"/>
-                                        <p:tgtEl>
-                                          <p:spTgt spid="51206">
-                                            <p:txEl>
-                                              <p:pRg st="5" end="5"/>
-                                            </p:txEl>
-                                          </p:spTgt>
-                                        </p:tgtEl>
-                                      </p:cBhvr>
-                                    </p:animEffect>
-                                  </p:childTnLst>
-                                </p:cTn>
-                              </p:par>
-                              <p:par>
-                                <p:cTn id="23" presetID="22" presetClass="entr" presetSubtype="8" fill="hold" grpId="0" nodeType="withEffect">
-                                  <p:stCondLst>
-                                    <p:cond delay="0"/>
-                                  </p:stCondLst>
-                                  <p:childTnLst>
-                                    <p:set>
-                                      <p:cBhvr>
-                                        <p:cTn id="24" dur="1" fill="hold">
-                                          <p:stCondLst>
-                                            <p:cond delay="0"/>
-                                          </p:stCondLst>
-                                        </p:cTn>
-                                        <p:tgtEl>
-                                          <p:spTgt spid="51206">
-                                            <p:txEl>
-                                              <p:pRg st="6" end="6"/>
-                                            </p:txEl>
-                                          </p:spTgt>
-                                        </p:tgtEl>
-                                        <p:attrNameLst>
-                                          <p:attrName>style.visibility</p:attrName>
-                                        </p:attrNameLst>
-                                      </p:cBhvr>
-                                      <p:to>
-                                        <p:strVal val="visible"/>
-                                      </p:to>
-                                    </p:set>
-                                    <p:animEffect transition="in" filter="wipe(left)">
-                                      <p:cBhvr>
-                                        <p:cTn id="25" dur="500"/>
-                                        <p:tgtEl>
-                                          <p:spTgt spid="51206">
-                                            <p:txEl>
-                                              <p:pRg st="6" end="6"/>
-                                            </p:txEl>
-                                          </p:spTgt>
-                                        </p:tgtEl>
-                                      </p:cBhvr>
-                                    </p:animEffect>
-                                  </p:childTnLst>
-                                </p:cTn>
-                              </p:par>
-                              <p:par>
-                                <p:cTn id="26" presetID="22" presetClass="entr" presetSubtype="8" fill="hold" grpId="0" nodeType="withEffect">
-                                  <p:stCondLst>
-                                    <p:cond delay="0"/>
-                                  </p:stCondLst>
-                                  <p:childTnLst>
-                                    <p:set>
-                                      <p:cBhvr>
-                                        <p:cTn id="27" dur="1" fill="hold">
-                                          <p:stCondLst>
-                                            <p:cond delay="0"/>
-                                          </p:stCondLst>
-                                        </p:cTn>
-                                        <p:tgtEl>
-                                          <p:spTgt spid="51206">
-                                            <p:txEl>
-                                              <p:pRg st="7" end="7"/>
-                                            </p:txEl>
-                                          </p:spTgt>
-                                        </p:tgtEl>
-                                        <p:attrNameLst>
-                                          <p:attrName>style.visibility</p:attrName>
-                                        </p:attrNameLst>
-                                      </p:cBhvr>
-                                      <p:to>
-                                        <p:strVal val="visible"/>
-                                      </p:to>
-                                    </p:set>
-                                    <p:animEffect transition="in" filter="wipe(left)">
-                                      <p:cBhvr>
-                                        <p:cTn id="28" dur="500"/>
-                                        <p:tgtEl>
-                                          <p:spTgt spid="51206">
-                                            <p:txEl>
-                                              <p:pRg st="7" end="7"/>
-                                            </p:txEl>
-                                          </p:spTgt>
-                                        </p:tgtEl>
-                                      </p:cBhvr>
-                                    </p:animEffect>
-                                  </p:childTnLst>
-                                </p:cTn>
-                              </p:par>
-                              <p:par>
-                                <p:cTn id="29" presetID="22" presetClass="entr" presetSubtype="8" fill="hold" grpId="0" nodeType="withEffect">
-                                  <p:stCondLst>
-                                    <p:cond delay="0"/>
-                                  </p:stCondLst>
-                                  <p:childTnLst>
-                                    <p:set>
-                                      <p:cBhvr>
-                                        <p:cTn id="30" dur="1" fill="hold">
-                                          <p:stCondLst>
-                                            <p:cond delay="0"/>
-                                          </p:stCondLst>
-                                        </p:cTn>
-                                        <p:tgtEl>
-                                          <p:spTgt spid="51206">
-                                            <p:txEl>
-                                              <p:pRg st="8" end="8"/>
-                                            </p:txEl>
-                                          </p:spTgt>
-                                        </p:tgtEl>
-                                        <p:attrNameLst>
-                                          <p:attrName>style.visibility</p:attrName>
-                                        </p:attrNameLst>
-                                      </p:cBhvr>
-                                      <p:to>
-                                        <p:strVal val="visible"/>
-                                      </p:to>
-                                    </p:set>
-                                    <p:animEffect transition="in" filter="wipe(left)">
-                                      <p:cBhvr>
-                                        <p:cTn id="31" dur="500"/>
-                                        <p:tgtEl>
-                                          <p:spTgt spid="51206">
-                                            <p:txEl>
-                                              <p:pRg st="8" end="8"/>
-                                            </p:txEl>
-                                          </p:spTgt>
-                                        </p:tgtEl>
-                                      </p:cBhvr>
-                                    </p:animEffect>
-                                  </p:childTnLst>
-                                </p:cTn>
-                              </p:par>
-                            </p:childTnLst>
-                          </p:cTn>
-                        </p:par>
-                      </p:childTnLst>
-                    </p:cTn>
-                  </p:par>
-                </p:childTnLst>
-              </p:cTn>
-              <p:prevCondLst>
-                <p:cond evt="onPrev" delay="0">
-                  <p:tgtEl>
-                    <p:sldTgt/>
-                  </p:tgtEl>
-                </p:cond>
-              </p:prevCondLst>
-              <p:nextCondLst>
-                <p:cond evt="onNext" delay="0">
-                  <p:tgtEl>
-                    <p:sldTgt/>
-                  </p:tgtEl>
-                </p:cond>
-              </p:nextCondLst>
-            </p:seq>
-          </p:childTnLst>
-        </p:cTn>
-      </p:par>
-    </p:tnLst>
-    <p:bldLst>
-      <p:bldP spid="51206" grpId="0" build="p" autoUpdateAnimBg="0"/>
-    </p:bldLst>
-  </p:timing>
-</p:sld>
-</file>
-
-<file path=ppt/slides/slide30.xml><?xml version="1.0" encoding="utf-8"?>
+<file path=ppt/slides/slide32.xml><?xml version="1.0" encoding="utf-8"?>
 <p:sld xmlns:a="http://schemas.openxmlformats.org/drawingml/2006/main" xmlns:r="http://schemas.openxmlformats.org/officeDocument/2006/relationships" xmlns:p="http://schemas.openxmlformats.org/presentationml/2006/main">
   <p:cSld>
     <p:spTree>
@@ -20618,7 +21191,7 @@
                 </a:solidFill>
               </a:rPr>
               <a:pPr eaLnBrk="1" hangingPunct="1"/>
-              <a:t>30</a:t>
+              <a:t>32</a:t>
             </a:fld>
             <a:r>
               <a:rPr kumimoji="0" lang="en-US" altLang="zh-TW" sz="1400" dirty="0" smtClean="0">
@@ -20805,7 +21378,7 @@
           <a:graphicData uri="http://schemas.openxmlformats.org/presentationml/2006/ole">
             <mc:AlternateContent xmlns:mc="http://schemas.openxmlformats.org/markup-compatibility/2006">
               <mc:Choice xmlns:v="urn:schemas-microsoft-com:vml" Requires="v">
-                <p:oleObj spid="_x0000_s3101" name="方程式" r:id="rId3" imgW="419040" imgH="444240" progId="Equation.3">
+                <p:oleObj spid="_x0000_s3105" name="方程式" r:id="rId3" imgW="419040" imgH="444240" progId="Equation.3">
                   <p:embed/>
                 </p:oleObj>
               </mc:Choice>
@@ -20902,7 +21475,7 @@
 </p:sld>
 </file>
 
-<file path=ppt/slides/slide31.xml><?xml version="1.0" encoding="utf-8"?>
+<file path=ppt/slides/slide33.xml><?xml version="1.0" encoding="utf-8"?>
 <p:sld xmlns:a="http://schemas.openxmlformats.org/drawingml/2006/main" xmlns:r="http://schemas.openxmlformats.org/officeDocument/2006/relationships" xmlns:p="http://schemas.openxmlformats.org/presentationml/2006/main">
   <p:cSld>
     <p:spTree>
@@ -21086,7 +21659,7 @@
                 </a:solidFill>
               </a:rPr>
               <a:pPr eaLnBrk="1" hangingPunct="1"/>
-              <a:t>31</a:t>
+              <a:t>33</a:t>
             </a:fld>
             <a:r>
               <a:rPr kumimoji="0" lang="en-US" altLang="zh-TW" sz="1400" dirty="0" smtClean="0">
@@ -21221,7 +21794,7 @@
           <a:graphicData uri="http://schemas.openxmlformats.org/presentationml/2006/ole">
             <mc:AlternateContent xmlns:mc="http://schemas.openxmlformats.org/markup-compatibility/2006">
               <mc:Choice xmlns:v="urn:schemas-microsoft-com:vml" Requires="v">
-                <p:oleObj spid="_x0000_s4152" name="方程式" r:id="rId3" imgW="457200" imgH="444240" progId="Equation.3">
+                <p:oleObj spid="_x0000_s4160" name="方程式" r:id="rId3" imgW="457200" imgH="444240" progId="Equation.3">
                   <p:embed/>
                 </p:oleObj>
               </mc:Choice>
@@ -21316,7 +21889,7 @@
           <a:graphicData uri="http://schemas.openxmlformats.org/presentationml/2006/ole">
             <mc:AlternateContent xmlns:mc="http://schemas.openxmlformats.org/markup-compatibility/2006">
               <mc:Choice xmlns:v="urn:schemas-microsoft-com:vml" Requires="v">
-                <p:oleObj spid="_x0000_s4153" name="方程式" r:id="rId5" imgW="609480" imgH="457200" progId="Equation.3">
+                <p:oleObj spid="_x0000_s4161" name="方程式" r:id="rId5" imgW="609480" imgH="457200" progId="Equation.3">
                   <p:embed/>
                 </p:oleObj>
               </mc:Choice>
@@ -21413,7 +21986,7 @@
 </p:sld>
 </file>
 
-<file path=ppt/slides/slide32.xml><?xml version="1.0" encoding="utf-8"?>
+<file path=ppt/slides/slide34.xml><?xml version="1.0" encoding="utf-8"?>
 <p:sld xmlns:a="http://schemas.openxmlformats.org/drawingml/2006/main" xmlns:r="http://schemas.openxmlformats.org/officeDocument/2006/relationships" xmlns:p="http://schemas.openxmlformats.org/presentationml/2006/main">
   <p:cSld>
     <p:spTree>
@@ -21597,7 +22170,7 @@
                 </a:solidFill>
               </a:rPr>
               <a:pPr eaLnBrk="1" hangingPunct="1"/>
-              <a:t>32</a:t>
+              <a:t>34</a:t>
             </a:fld>
             <a:r>
               <a:rPr kumimoji="0" lang="en-US" altLang="zh-TW" sz="1400" dirty="0" smtClean="0">
@@ -22884,7 +23457,7 @@
 </p:sld>
 </file>
 
-<file path=ppt/slides/slide33.xml><?xml version="1.0" encoding="utf-8"?>
+<file path=ppt/slides/slide35.xml><?xml version="1.0" encoding="utf-8"?>
 <p:sld xmlns:a="http://schemas.openxmlformats.org/drawingml/2006/main" xmlns:r="http://schemas.openxmlformats.org/officeDocument/2006/relationships" xmlns:p="http://schemas.openxmlformats.org/presentationml/2006/main">
   <p:cSld>
     <p:spTree>
@@ -22963,7 +23536,7 @@
 </p:sld>
 </file>
 
-<file path=ppt/slides/slide34.xml><?xml version="1.0" encoding="utf-8"?>
+<file path=ppt/slides/slide36.xml><?xml version="1.0" encoding="utf-8"?>
 <p:sld xmlns:a="http://schemas.openxmlformats.org/drawingml/2006/main" xmlns:r="http://schemas.openxmlformats.org/officeDocument/2006/relationships" xmlns:p="http://schemas.openxmlformats.org/presentationml/2006/main">
   <p:cSld>
     <p:spTree>
@@ -23423,7 +23996,7 @@
           <a:graphicData uri="http://schemas.openxmlformats.org/presentationml/2006/ole">
             <mc:AlternateContent xmlns:mc="http://schemas.openxmlformats.org/markup-compatibility/2006">
               <mc:Choice xmlns:v="urn:schemas-microsoft-com:vml" Requires="v">
-                <p:oleObj spid="_x0000_s5176" name="Equation" r:id="rId3" imgW="3340080" imgH="622080" progId="Equation.3">
+                <p:oleObj spid="_x0000_s5184" name="Equation" r:id="rId3" imgW="3340080" imgH="622080" progId="Equation.3">
                   <p:embed/>
                 </p:oleObj>
               </mc:Choice>
@@ -23522,7 +24095,7 @@
           <a:graphicData uri="http://schemas.openxmlformats.org/presentationml/2006/ole">
             <mc:AlternateContent xmlns:mc="http://schemas.openxmlformats.org/markup-compatibility/2006">
               <mc:Choice xmlns:v="urn:schemas-microsoft-com:vml" Requires="v">
-                <p:oleObj spid="_x0000_s5177" name="Equation" r:id="rId5" imgW="914400" imgH="622080" progId="Equation.3">
+                <p:oleObj spid="_x0000_s5185" name="Equation" r:id="rId5" imgW="914400" imgH="622080" progId="Equation.3">
                   <p:embed/>
                 </p:oleObj>
               </mc:Choice>
@@ -23619,7 +24192,7 @@
 </p:sld>
 </file>
 
-<file path=ppt/slides/slide35.xml><?xml version="1.0" encoding="utf-8"?>
+<file path=ppt/slides/slide37.xml><?xml version="1.0" encoding="utf-8"?>
 <p:sld xmlns:a="http://schemas.openxmlformats.org/drawingml/2006/main" xmlns:r="http://schemas.openxmlformats.org/officeDocument/2006/relationships" xmlns:p="http://schemas.openxmlformats.org/presentationml/2006/main">
   <p:cSld>
     <p:spTree>
@@ -24752,7 +25325,7 @@
 </p:sld>
 </file>
 
-<file path=ppt/slides/slide36.xml><?xml version="1.0" encoding="utf-8"?>
+<file path=ppt/slides/slide38.xml><?xml version="1.0" encoding="utf-8"?>
 <p:sld xmlns:a="http://schemas.openxmlformats.org/drawingml/2006/main" xmlns:r="http://schemas.openxmlformats.org/officeDocument/2006/relationships" xmlns:p="http://schemas.openxmlformats.org/presentationml/2006/main">
   <p:cSld>
     <p:spTree>
@@ -25627,7 +26200,7 @@
           <a:graphicData uri="http://schemas.openxmlformats.org/presentationml/2006/ole">
             <mc:AlternateContent xmlns:mc="http://schemas.openxmlformats.org/markup-compatibility/2006">
               <mc:Choice xmlns:v="urn:schemas-microsoft-com:vml" Requires="v">
-                <p:oleObj spid="_x0000_s6173" name="Equation" r:id="rId3" imgW="3340080" imgH="622080" progId="Equation.3">
+                <p:oleObj spid="_x0000_s6177" name="Equation" r:id="rId3" imgW="3340080" imgH="622080" progId="Equation.3">
                   <p:embed/>
                 </p:oleObj>
               </mc:Choice>

</xml_diff>